<commit_message>
finished powerpoint and docx
</commit_message>
<xml_diff>
--- a/Annexes/Oral.pptx
+++ b/Annexes/Oral.pptx
@@ -12,6 +12,8 @@
     <p:sldId id="261" r:id="rId6"/>
     <p:sldId id="262" r:id="rId7"/>
     <p:sldId id="264" r:id="rId8"/>
+    <p:sldId id="265" r:id="rId9"/>
+    <p:sldId id="266" r:id="rId10"/>
   </p:sldIdLst>
   <p:sldSz cx="12192000" cy="6858000"/>
   <p:notesSz cx="6858000" cy="9144000"/>
@@ -265,7 +267,7 @@
           <a:p>
             <a:fld id="{591D5C4A-F9D7-4A83-8608-2BBA2213BD92}" type="datetimeFigureOut">
               <a:rPr lang="fr-FR" smtClean="0"/>
-              <a:t>27/03/2024</a:t>
+              <a:t>28/03/2024</a:t>
             </a:fld>
             <a:endParaRPr lang="fr-FR"/>
           </a:p>
@@ -463,7 +465,7 @@
           <a:p>
             <a:fld id="{591D5C4A-F9D7-4A83-8608-2BBA2213BD92}" type="datetimeFigureOut">
               <a:rPr lang="fr-FR" smtClean="0"/>
-              <a:t>27/03/2024</a:t>
+              <a:t>28/03/2024</a:t>
             </a:fld>
             <a:endParaRPr lang="fr-FR"/>
           </a:p>
@@ -671,7 +673,7 @@
           <a:p>
             <a:fld id="{591D5C4A-F9D7-4A83-8608-2BBA2213BD92}" type="datetimeFigureOut">
               <a:rPr lang="fr-FR" smtClean="0"/>
-              <a:t>27/03/2024</a:t>
+              <a:t>28/03/2024</a:t>
             </a:fld>
             <a:endParaRPr lang="fr-FR"/>
           </a:p>
@@ -869,7 +871,7 @@
           <a:p>
             <a:fld id="{591D5C4A-F9D7-4A83-8608-2BBA2213BD92}" type="datetimeFigureOut">
               <a:rPr lang="fr-FR" smtClean="0"/>
-              <a:t>27/03/2024</a:t>
+              <a:t>28/03/2024</a:t>
             </a:fld>
             <a:endParaRPr lang="fr-FR"/>
           </a:p>
@@ -1144,7 +1146,7 @@
           <a:p>
             <a:fld id="{591D5C4A-F9D7-4A83-8608-2BBA2213BD92}" type="datetimeFigureOut">
               <a:rPr lang="fr-FR" smtClean="0"/>
-              <a:t>27/03/2024</a:t>
+              <a:t>28/03/2024</a:t>
             </a:fld>
             <a:endParaRPr lang="fr-FR"/>
           </a:p>
@@ -1409,7 +1411,7 @@
           <a:p>
             <a:fld id="{591D5C4A-F9D7-4A83-8608-2BBA2213BD92}" type="datetimeFigureOut">
               <a:rPr lang="fr-FR" smtClean="0"/>
-              <a:t>27/03/2024</a:t>
+              <a:t>28/03/2024</a:t>
             </a:fld>
             <a:endParaRPr lang="fr-FR"/>
           </a:p>
@@ -1821,7 +1823,7 @@
           <a:p>
             <a:fld id="{591D5C4A-F9D7-4A83-8608-2BBA2213BD92}" type="datetimeFigureOut">
               <a:rPr lang="fr-FR" smtClean="0"/>
-              <a:t>27/03/2024</a:t>
+              <a:t>28/03/2024</a:t>
             </a:fld>
             <a:endParaRPr lang="fr-FR"/>
           </a:p>
@@ -1962,7 +1964,7 @@
           <a:p>
             <a:fld id="{591D5C4A-F9D7-4A83-8608-2BBA2213BD92}" type="datetimeFigureOut">
               <a:rPr lang="fr-FR" smtClean="0"/>
-              <a:t>27/03/2024</a:t>
+              <a:t>28/03/2024</a:t>
             </a:fld>
             <a:endParaRPr lang="fr-FR"/>
           </a:p>
@@ -2075,7 +2077,7 @@
           <a:p>
             <a:fld id="{591D5C4A-F9D7-4A83-8608-2BBA2213BD92}" type="datetimeFigureOut">
               <a:rPr lang="fr-FR" smtClean="0"/>
-              <a:t>27/03/2024</a:t>
+              <a:t>28/03/2024</a:t>
             </a:fld>
             <a:endParaRPr lang="fr-FR"/>
           </a:p>
@@ -2386,7 +2388,7 @@
           <a:p>
             <a:fld id="{591D5C4A-F9D7-4A83-8608-2BBA2213BD92}" type="datetimeFigureOut">
               <a:rPr lang="fr-FR" smtClean="0"/>
-              <a:t>27/03/2024</a:t>
+              <a:t>28/03/2024</a:t>
             </a:fld>
             <a:endParaRPr lang="fr-FR"/>
           </a:p>
@@ -2674,7 +2676,7 @@
           <a:p>
             <a:fld id="{591D5C4A-F9D7-4A83-8608-2BBA2213BD92}" type="datetimeFigureOut">
               <a:rPr lang="fr-FR" smtClean="0"/>
-              <a:t>27/03/2024</a:t>
+              <a:t>28/03/2024</a:t>
             </a:fld>
             <a:endParaRPr lang="fr-FR"/>
           </a:p>
@@ -2915,7 +2917,7 @@
           <a:p>
             <a:fld id="{591D5C4A-F9D7-4A83-8608-2BBA2213BD92}" type="datetimeFigureOut">
               <a:rPr lang="fr-FR" smtClean="0"/>
-              <a:t>27/03/2024</a:t>
+              <a:t>28/03/2024</a:t>
             </a:fld>
             <a:endParaRPr lang="fr-FR"/>
           </a:p>
@@ -3616,6 +3618,13 @@
   <p:clrMapOvr>
     <a:masterClrMapping/>
   </p:clrMapOvr>
+  <p:timing>
+    <p:tnLst>
+      <p:par>
+        <p:cTn id="1" dur="indefinite" restart="never" nodeType="tmRoot"/>
+      </p:par>
+    </p:tnLst>
+  </p:timing>
 </p:sld>
 </file>
 
@@ -3887,8 +3896,8 @@
         </p:nvSpPr>
         <p:spPr>
           <a:xfrm>
-            <a:off x="4568889" y="2551837"/>
-            <a:ext cx="3054221" cy="1754326"/>
+            <a:off x="2689122" y="2483011"/>
+            <a:ext cx="6813755" cy="1754326"/>
           </a:xfrm>
           <a:prstGeom prst="rect">
             <a:avLst/>
@@ -3906,11 +3915,14 @@
               <a:buChar char="-"/>
             </a:pPr>
             <a:r>
-              <a:rPr lang="fr-FR" sz="5400" b="1" dirty="0">
+              <a:rPr lang="fr-FR" sz="5400" b="1" dirty="0" smtClean="0">
                 <a:latin typeface="Josefin Slab" panose="02000000000000000000" pitchFamily="2" charset="0"/>
               </a:rPr>
-              <a:t>Moi</a:t>
-            </a:r>
+              <a:t>Qui suis-je ?</a:t>
+            </a:r>
+            <a:endParaRPr lang="fr-FR" sz="5400" b="1" dirty="0">
+              <a:latin typeface="Josefin Slab" panose="02000000000000000000" pitchFamily="2" charset="0"/>
+            </a:endParaRPr>
           </a:p>
           <a:p>
             <a:pPr marL="285750" indent="-285750">
@@ -3918,11 +3930,14 @@
               <a:buChar char="-"/>
             </a:pPr>
             <a:r>
-              <a:rPr lang="fr-FR" sz="5400" b="1" dirty="0">
+              <a:rPr lang="fr-FR" sz="5400" b="1" dirty="0" smtClean="0">
                 <a:latin typeface="Josefin Slab" panose="02000000000000000000" pitchFamily="2" charset="0"/>
               </a:rPr>
-              <a:t>Le projet</a:t>
-            </a:r>
+              <a:t>Quel est mon projet ?</a:t>
+            </a:r>
+            <a:endParaRPr lang="fr-FR" sz="5400" b="1" dirty="0">
+              <a:latin typeface="Josefin Slab" panose="02000000000000000000" pitchFamily="2" charset="0"/>
+            </a:endParaRPr>
           </a:p>
         </p:txBody>
       </p:sp>
@@ -3986,7 +4001,7 @@
     <a:masterClrMapping/>
   </p:clrMapOvr>
   <mc:AlternateContent xmlns:mc="http://schemas.openxmlformats.org/markup-compatibility/2006">
-    <mc:Choice xmlns:p159="http://schemas.microsoft.com/office/powerpoint/2015/09/main" Requires="p159">
+    <mc:Choice xmlns:p159="http://schemas.microsoft.com/office/powerpoint/2015/09/main" xmlns="" Requires="p159">
       <p:transition xmlns:p14="http://schemas.microsoft.com/office/powerpoint/2010/main" spd="slow" p14:dur="2000">
         <p159:morph option="byObject"/>
       </p:transition>
@@ -3997,6 +4012,13 @@
       </p:transition>
     </mc:Fallback>
   </mc:AlternateContent>
+  <p:timing>
+    <p:tnLst>
+      <p:par>
+        <p:cTn id="1" dur="indefinite" restart="never" nodeType="tmRoot"/>
+      </p:par>
+    </p:tnLst>
+  </p:timing>
 </p:sld>
 </file>
 
@@ -4427,7 +4449,7 @@
     <a:masterClrMapping/>
   </p:clrMapOvr>
   <mc:AlternateContent xmlns:mc="http://schemas.openxmlformats.org/markup-compatibility/2006">
-    <mc:Choice xmlns:p159="http://schemas.microsoft.com/office/powerpoint/2015/09/main" Requires="p159">
+    <mc:Choice xmlns:p159="http://schemas.microsoft.com/office/powerpoint/2015/09/main" xmlns="" Requires="p159">
       <p:transition xmlns:p14="http://schemas.microsoft.com/office/powerpoint/2010/main" spd="slow" p14:dur="2000">
         <p159:morph option="byObject"/>
       </p:transition>
@@ -4438,6 +4460,13 @@
       </p:transition>
     </mc:Fallback>
   </mc:AlternateContent>
+  <p:timing>
+    <p:tnLst>
+      <p:par>
+        <p:cTn id="1" dur="indefinite" restart="never" nodeType="tmRoot"/>
+      </p:par>
+    </p:tnLst>
+  </p:timing>
 </p:sld>
 </file>
 
@@ -4808,7 +4837,7 @@
     <a:masterClrMapping/>
   </p:clrMapOvr>
   <mc:AlternateContent xmlns:mc="http://schemas.openxmlformats.org/markup-compatibility/2006">
-    <mc:Choice xmlns:p159="http://schemas.microsoft.com/office/powerpoint/2015/09/main" Requires="p159">
+    <mc:Choice xmlns:p159="http://schemas.microsoft.com/office/powerpoint/2015/09/main" xmlns="" Requires="p159">
       <p:transition xmlns:p14="http://schemas.microsoft.com/office/powerpoint/2010/main" spd="slow" p14:dur="2000">
         <p159:morph option="byObject"/>
       </p:transition>
@@ -4819,6 +4848,13 @@
       </p:transition>
     </mc:Fallback>
   </mc:AlternateContent>
+  <p:timing>
+    <p:tnLst>
+      <p:par>
+        <p:cTn id="1" dur="indefinite" restart="never" nodeType="tmRoot"/>
+      </p:par>
+    </p:tnLst>
+  </p:timing>
 </p:sld>
 </file>
 
@@ -5213,7 +5249,7 @@
     <a:masterClrMapping/>
   </p:clrMapOvr>
   <mc:AlternateContent xmlns:mc="http://schemas.openxmlformats.org/markup-compatibility/2006">
-    <mc:Choice xmlns:p159="http://schemas.microsoft.com/office/powerpoint/2015/09/main" Requires="p159">
+    <mc:Choice xmlns:p159="http://schemas.microsoft.com/office/powerpoint/2015/09/main" xmlns="" Requires="p159">
       <p:transition xmlns:p14="http://schemas.microsoft.com/office/powerpoint/2010/main" spd="slow" p14:dur="2000">
         <p159:morph option="byObject"/>
       </p:transition>
@@ -5224,6 +5260,13 @@
       </p:transition>
     </mc:Fallback>
   </mc:AlternateContent>
+  <p:timing>
+    <p:tnLst>
+      <p:par>
+        <p:cTn id="1" dur="indefinite" restart="never" nodeType="tmRoot"/>
+      </p:par>
+    </p:tnLst>
+  </p:timing>
 </p:sld>
 </file>
 
@@ -5455,7 +5498,7 @@
         <p:spPr>
           <a:xfrm>
             <a:off x="3188970" y="2136338"/>
-            <a:ext cx="5814060" cy="2585323"/>
+            <a:ext cx="6269662" cy="2585323"/>
           </a:xfrm>
           <a:prstGeom prst="rect">
             <a:avLst/>
@@ -5476,8 +5519,17 @@
               <a:rPr lang="fr-FR" sz="5400" b="1" dirty="0">
                 <a:latin typeface="Josefin Slab" panose="02000000000000000000" pitchFamily="2" charset="0"/>
               </a:rPr>
-              <a:t>Tests utilisateur</a:t>
-            </a:r>
+              <a:t>Tests </a:t>
+            </a:r>
+            <a:r>
+              <a:rPr lang="fr-FR" sz="5400" b="1" dirty="0" smtClean="0">
+                <a:latin typeface="Josefin Slab" panose="02000000000000000000" pitchFamily="2" charset="0"/>
+              </a:rPr>
+              <a:t>utilisateurs</a:t>
+            </a:r>
+            <a:endParaRPr lang="fr-FR" sz="5400" b="1" dirty="0">
+              <a:latin typeface="Josefin Slab" panose="02000000000000000000" pitchFamily="2" charset="0"/>
+            </a:endParaRPr>
           </a:p>
           <a:p>
             <a:pPr marL="285750" indent="-285750">
@@ -5500,8 +5552,17 @@
               <a:rPr lang="fr-FR" sz="5400" b="1" dirty="0">
                 <a:latin typeface="Josefin Slab" panose="02000000000000000000" pitchFamily="2" charset="0"/>
               </a:rPr>
-              <a:t>Retours utilisateur</a:t>
-            </a:r>
+              <a:t>Retours </a:t>
+            </a:r>
+            <a:r>
+              <a:rPr lang="fr-FR" sz="5400" b="1" dirty="0" smtClean="0">
+                <a:latin typeface="Josefin Slab" panose="02000000000000000000" pitchFamily="2" charset="0"/>
+              </a:rPr>
+              <a:t>utilisateurs</a:t>
+            </a:r>
+            <a:endParaRPr lang="fr-FR" sz="5400" b="1" dirty="0">
+              <a:latin typeface="Josefin Slab" panose="02000000000000000000" pitchFamily="2" charset="0"/>
+            </a:endParaRPr>
           </a:p>
         </p:txBody>
       </p:sp>
@@ -5606,7 +5667,7 @@
     <a:masterClrMapping/>
   </p:clrMapOvr>
   <mc:AlternateContent xmlns:mc="http://schemas.openxmlformats.org/markup-compatibility/2006">
-    <mc:Choice xmlns:p159="http://schemas.microsoft.com/office/powerpoint/2015/09/main" Requires="p159">
+    <mc:Choice xmlns:p159="http://schemas.microsoft.com/office/powerpoint/2015/09/main" xmlns="" Requires="p159">
       <p:transition xmlns:p14="http://schemas.microsoft.com/office/powerpoint/2010/main" spd="slow" p14:dur="2000">
         <p159:morph option="byObject"/>
       </p:transition>
@@ -5617,6 +5678,13 @@
       </p:transition>
     </mc:Fallback>
   </mc:AlternateContent>
+  <p:timing>
+    <p:tnLst>
+      <p:par>
+        <p:cTn id="1" dur="indefinite" restart="never" nodeType="tmRoot"/>
+      </p:par>
+    </p:tnLst>
+  </p:timing>
 </p:sld>
 </file>
 
@@ -5685,7 +5753,11 @@
           <a:lstStyle/>
           <a:p>
             <a:pPr algn="ctr"/>
-            <a:endParaRPr lang="fr-FR"/>
+            <a:endParaRPr lang="fr-FR">
+              <a:solidFill>
+                <a:srgbClr val="F2E8CF"/>
+              </a:solidFill>
+            </a:endParaRPr>
           </a:p>
         </p:txBody>
       </p:sp>
@@ -5835,71 +5907,6 @@
       </p:sp>
       <p:sp>
         <p:nvSpPr>
-          <p:cNvPr id="8" name="ZoneTexte 7">
-            <a:extLst>
-              <a:ext uri="{FF2B5EF4-FFF2-40B4-BE49-F238E27FC236}">
-                <a16:creationId xmlns:a16="http://schemas.microsoft.com/office/drawing/2014/main" id="{6699D9B0-71B5-D04A-A7EC-9AE14264E231}"/>
-              </a:ext>
-            </a:extLst>
-          </p:cNvPr>
-          <p:cNvSpPr txBox="1"/>
-          <p:nvPr/>
-        </p:nvSpPr>
-        <p:spPr>
-          <a:xfrm>
-            <a:off x="2118360" y="2136338"/>
-            <a:ext cx="7955280" cy="2585323"/>
-          </a:xfrm>
-          <a:prstGeom prst="rect">
-            <a:avLst/>
-          </a:prstGeom>
-          <a:noFill/>
-        </p:spPr>
-        <p:txBody>
-          <a:bodyPr wrap="square" rtlCol="0">
-            <a:spAutoFit/>
-          </a:bodyPr>
-          <a:lstStyle/>
-          <a:p>
-            <a:pPr marL="285750" indent="-285750">
-              <a:buFontTx/>
-              <a:buChar char="-"/>
-            </a:pPr>
-            <a:r>
-              <a:rPr lang="fr-FR" sz="5400" b="1" dirty="0">
-                <a:latin typeface="Josefin Slab" panose="02000000000000000000" pitchFamily="2" charset="0"/>
-              </a:rPr>
-              <a:t>Marketing</a:t>
-            </a:r>
-          </a:p>
-          <a:p>
-            <a:pPr marL="285750" indent="-285750">
-              <a:buFontTx/>
-              <a:buChar char="-"/>
-            </a:pPr>
-            <a:r>
-              <a:rPr lang="fr-FR" sz="5400" b="1" dirty="0">
-                <a:latin typeface="Josefin Slab" panose="02000000000000000000" pitchFamily="2" charset="0"/>
-              </a:rPr>
-              <a:t>Collecte de retours</a:t>
-            </a:r>
-          </a:p>
-          <a:p>
-            <a:pPr marL="285750" indent="-285750">
-              <a:buFontTx/>
-              <a:buChar char="-"/>
-            </a:pPr>
-            <a:r>
-              <a:rPr lang="fr-FR" sz="5400" b="1" dirty="0">
-                <a:latin typeface="Josefin Slab" panose="02000000000000000000" pitchFamily="2" charset="0"/>
-              </a:rPr>
-              <a:t>Nouvelles fonctionnalités</a:t>
-            </a:r>
-          </a:p>
-        </p:txBody>
-      </p:sp>
-      <p:sp>
-        <p:nvSpPr>
           <p:cNvPr id="9" name="ZoneTexte 8">
             <a:extLst>
               <a:ext uri="{FF2B5EF4-FFF2-40B4-BE49-F238E27FC236}">
@@ -5977,17 +5984,53 @@
           <a:p>
             <a:pPr algn="ctr"/>
             <a:r>
-              <a:rPr lang="fr-FR" sz="2800" b="1" dirty="0">
+              <a:rPr lang="fr-FR" sz="2800" b="1" dirty="0" smtClean="0">
                 <a:solidFill>
                   <a:srgbClr val="F2E8CF"/>
                 </a:solidFill>
                 <a:latin typeface="Josefin Slab" panose="02000000000000000000" pitchFamily="2" charset="0"/>
               </a:rPr>
-              <a:t>Suite…</a:t>
-            </a:r>
-          </a:p>
-        </p:txBody>
-      </p:sp>
+              <a:t>Démonstration technique</a:t>
+            </a:r>
+            <a:endParaRPr lang="fr-FR" sz="2800" b="1" dirty="0">
+              <a:solidFill>
+                <a:srgbClr val="F2E8CF"/>
+              </a:solidFill>
+              <a:latin typeface="Josefin Slab" panose="02000000000000000000" pitchFamily="2" charset="0"/>
+            </a:endParaRPr>
+          </a:p>
+        </p:txBody>
+      </p:sp>
+      <p:pic>
+        <p:nvPicPr>
+          <p:cNvPr id="10" name="Image 9"/>
+          <p:cNvPicPr>
+            <a:picLocks noChangeAspect="1"/>
+          </p:cNvPicPr>
+          <p:nvPr/>
+        </p:nvPicPr>
+        <p:blipFill>
+          <a:blip r:embed="rId2">
+            <a:extLst>
+              <a:ext uri="{28A0092B-C50C-407E-A947-70E740481C1C}">
+                <a14:useLocalDpi xmlns:a14="http://schemas.microsoft.com/office/drawing/2010/main" val="0"/>
+              </a:ext>
+            </a:extLst>
+          </a:blip>
+          <a:stretch>
+            <a:fillRect/>
+          </a:stretch>
+        </p:blipFill>
+        <p:spPr>
+          <a:xfrm>
+            <a:off x="4450582" y="1783582"/>
+            <a:ext cx="3290836" cy="3290836"/>
+          </a:xfrm>
+          <a:prstGeom prst="rect">
+            <a:avLst/>
+          </a:prstGeom>
+        </p:spPr>
+      </p:pic>
     </p:spTree>
     <p:extLst>
       <p:ext uri="{BB962C8B-B14F-4D97-AF65-F5344CB8AC3E}">
@@ -5999,7 +6042,7 @@
     <a:masterClrMapping/>
   </p:clrMapOvr>
   <mc:AlternateContent xmlns:mc="http://schemas.openxmlformats.org/markup-compatibility/2006">
-    <mc:Choice xmlns:p159="http://schemas.microsoft.com/office/powerpoint/2015/09/main" Requires="p159">
+    <mc:Choice xmlns:p159="http://schemas.microsoft.com/office/powerpoint/2015/09/main" xmlns="" Requires="p159">
       <p:transition xmlns:p14="http://schemas.microsoft.com/office/powerpoint/2010/main" spd="slow" p14:dur="2000">
         <p159:morph option="byObject"/>
       </p:transition>
@@ -6010,6 +6053,794 @@
       </p:transition>
     </mc:Fallback>
   </mc:AlternateContent>
+  <p:timing>
+    <p:tnLst>
+      <p:par>
+        <p:cTn id="1" dur="indefinite" restart="never" nodeType="tmRoot"/>
+      </p:par>
+    </p:tnLst>
+  </p:timing>
+</p:sld>
+</file>
+
+<file path=ppt/slides/slide8.xml><?xml version="1.0" encoding="utf-8"?>
+<p:sld xmlns:a="http://schemas.openxmlformats.org/drawingml/2006/main" xmlns:r="http://schemas.openxmlformats.org/officeDocument/2006/relationships" xmlns:p="http://schemas.openxmlformats.org/presentationml/2006/main">
+  <p:cSld>
+    <p:spTree>
+      <p:nvGrpSpPr>
+        <p:cNvPr id="1" name=""/>
+        <p:cNvGrpSpPr/>
+        <p:nvPr/>
+      </p:nvGrpSpPr>
+      <p:grpSpPr>
+        <a:xfrm>
+          <a:off x="0" y="0"/>
+          <a:ext cx="0" cy="0"/>
+          <a:chOff x="0" y="0"/>
+          <a:chExt cx="0" cy="0"/>
+        </a:xfrm>
+      </p:grpSpPr>
+      <p:sp>
+        <p:nvSpPr>
+          <p:cNvPr id="4" name="Rectangle 3">
+            <a:extLst>
+              <a:ext uri="{FF2B5EF4-FFF2-40B4-BE49-F238E27FC236}">
+                <a16:creationId xmlns:a16="http://schemas.microsoft.com/office/drawing/2014/main" id="{EBB56BDB-E14E-82A1-6EB0-7CC0F193CB3D}"/>
+              </a:ext>
+            </a:extLst>
+          </p:cNvPr>
+          <p:cNvSpPr/>
+          <p:nvPr/>
+        </p:nvSpPr>
+        <p:spPr>
+          <a:xfrm>
+            <a:off x="0" y="0"/>
+            <a:ext cx="12192000" cy="6858000"/>
+          </a:xfrm>
+          <a:prstGeom prst="rect">
+            <a:avLst/>
+          </a:prstGeom>
+          <a:solidFill>
+            <a:srgbClr val="F2E8CF"/>
+          </a:solidFill>
+          <a:ln>
+            <a:noFill/>
+          </a:ln>
+        </p:spPr>
+        <p:style>
+          <a:lnRef idx="2">
+            <a:schemeClr val="accent1">
+              <a:shade val="15000"/>
+            </a:schemeClr>
+          </a:lnRef>
+          <a:fillRef idx="1">
+            <a:schemeClr val="accent1"/>
+          </a:fillRef>
+          <a:effectRef idx="0">
+            <a:schemeClr val="accent1"/>
+          </a:effectRef>
+          <a:fontRef idx="minor">
+            <a:schemeClr val="lt1"/>
+          </a:fontRef>
+        </p:style>
+        <p:txBody>
+          <a:bodyPr rtlCol="0" anchor="ctr"/>
+          <a:lstStyle/>
+          <a:p>
+            <a:pPr algn="ctr"/>
+            <a:endParaRPr lang="fr-FR"/>
+          </a:p>
+        </p:txBody>
+      </p:sp>
+      <p:sp>
+        <p:nvSpPr>
+          <p:cNvPr id="5" name="Rectangle 4">
+            <a:extLst>
+              <a:ext uri="{FF2B5EF4-FFF2-40B4-BE49-F238E27FC236}">
+                <a16:creationId xmlns:a16="http://schemas.microsoft.com/office/drawing/2014/main" id="{6DE56A07-05B8-96F1-0F27-2D9D1661EEE3}"/>
+              </a:ext>
+            </a:extLst>
+          </p:cNvPr>
+          <p:cNvSpPr/>
+          <p:nvPr/>
+        </p:nvSpPr>
+        <p:spPr>
+          <a:xfrm>
+            <a:off x="0" y="0"/>
+            <a:ext cx="12192000" cy="632460"/>
+          </a:xfrm>
+          <a:prstGeom prst="rect">
+            <a:avLst/>
+          </a:prstGeom>
+          <a:solidFill>
+            <a:srgbClr val="6A994E"/>
+          </a:solidFill>
+          <a:ln>
+            <a:noFill/>
+          </a:ln>
+        </p:spPr>
+        <p:style>
+          <a:lnRef idx="2">
+            <a:schemeClr val="accent1">
+              <a:shade val="15000"/>
+            </a:schemeClr>
+          </a:lnRef>
+          <a:fillRef idx="1">
+            <a:schemeClr val="accent1"/>
+          </a:fillRef>
+          <a:effectRef idx="0">
+            <a:schemeClr val="accent1"/>
+          </a:effectRef>
+          <a:fontRef idx="minor">
+            <a:schemeClr val="lt1"/>
+          </a:fontRef>
+        </p:style>
+        <p:txBody>
+          <a:bodyPr rtlCol="0" anchor="ctr"/>
+          <a:lstStyle/>
+          <a:p>
+            <a:pPr algn="ctr"/>
+            <a:endParaRPr lang="fr-FR"/>
+          </a:p>
+        </p:txBody>
+      </p:sp>
+      <p:sp>
+        <p:nvSpPr>
+          <p:cNvPr id="6" name="Rectangle 5">
+            <a:extLst>
+              <a:ext uri="{FF2B5EF4-FFF2-40B4-BE49-F238E27FC236}">
+                <a16:creationId xmlns:a16="http://schemas.microsoft.com/office/drawing/2014/main" id="{97595E1C-2581-EB1B-6819-6060C625E8C0}"/>
+              </a:ext>
+            </a:extLst>
+          </p:cNvPr>
+          <p:cNvSpPr/>
+          <p:nvPr/>
+        </p:nvSpPr>
+        <p:spPr>
+          <a:xfrm>
+            <a:off x="0" y="6339840"/>
+            <a:ext cx="12192000" cy="518160"/>
+          </a:xfrm>
+          <a:prstGeom prst="rect">
+            <a:avLst/>
+          </a:prstGeom>
+          <a:solidFill>
+            <a:srgbClr val="6A994E"/>
+          </a:solidFill>
+          <a:ln>
+            <a:noFill/>
+          </a:ln>
+        </p:spPr>
+        <p:style>
+          <a:lnRef idx="2">
+            <a:schemeClr val="accent1">
+              <a:shade val="15000"/>
+            </a:schemeClr>
+          </a:lnRef>
+          <a:fillRef idx="1">
+            <a:schemeClr val="accent1"/>
+          </a:fillRef>
+          <a:effectRef idx="0">
+            <a:schemeClr val="accent1"/>
+          </a:effectRef>
+          <a:fontRef idx="minor">
+            <a:schemeClr val="lt1"/>
+          </a:fontRef>
+        </p:style>
+        <p:txBody>
+          <a:bodyPr rtlCol="0" anchor="ctr"/>
+          <a:lstStyle/>
+          <a:p>
+            <a:pPr algn="ctr"/>
+            <a:endParaRPr lang="fr-FR"/>
+          </a:p>
+        </p:txBody>
+      </p:sp>
+      <p:sp>
+        <p:nvSpPr>
+          <p:cNvPr id="2" name="ZoneTexte 1">
+            <a:extLst>
+              <a:ext uri="{FF2B5EF4-FFF2-40B4-BE49-F238E27FC236}">
+                <a16:creationId xmlns:a16="http://schemas.microsoft.com/office/drawing/2014/main" id="{59BB4A6D-3EBB-AC35-40B1-37C5140E7B97}"/>
+              </a:ext>
+            </a:extLst>
+          </p:cNvPr>
+          <p:cNvSpPr txBox="1"/>
+          <p:nvPr/>
+        </p:nvSpPr>
+        <p:spPr>
+          <a:xfrm>
+            <a:off x="83820" y="6414254"/>
+            <a:ext cx="1828800" cy="369332"/>
+          </a:xfrm>
+          <a:prstGeom prst="rect">
+            <a:avLst/>
+          </a:prstGeom>
+          <a:noFill/>
+        </p:spPr>
+        <p:txBody>
+          <a:bodyPr wrap="square" rtlCol="0">
+            <a:spAutoFit/>
+          </a:bodyPr>
+          <a:lstStyle/>
+          <a:p>
+            <a:r>
+              <a:rPr lang="fr-FR" dirty="0">
+                <a:solidFill>
+                  <a:srgbClr val="F2E8CF"/>
+                </a:solidFill>
+                <a:latin typeface="Josefin Slab" panose="02000000000000000000" pitchFamily="2" charset="0"/>
+              </a:rPr>
+              <a:t>Esteban Basson</a:t>
+            </a:r>
+          </a:p>
+        </p:txBody>
+      </p:sp>
+      <p:sp>
+        <p:nvSpPr>
+          <p:cNvPr id="8" name="ZoneTexte 7">
+            <a:extLst>
+              <a:ext uri="{FF2B5EF4-FFF2-40B4-BE49-F238E27FC236}">
+                <a16:creationId xmlns:a16="http://schemas.microsoft.com/office/drawing/2014/main" id="{6699D9B0-71B5-D04A-A7EC-9AE14264E231}"/>
+              </a:ext>
+            </a:extLst>
+          </p:cNvPr>
+          <p:cNvSpPr txBox="1"/>
+          <p:nvPr/>
+        </p:nvSpPr>
+        <p:spPr>
+          <a:xfrm>
+            <a:off x="2118360" y="2136338"/>
+            <a:ext cx="7955280" cy="2585323"/>
+          </a:xfrm>
+          <a:prstGeom prst="rect">
+            <a:avLst/>
+          </a:prstGeom>
+          <a:noFill/>
+        </p:spPr>
+        <p:txBody>
+          <a:bodyPr wrap="square" rtlCol="0">
+            <a:spAutoFit/>
+          </a:bodyPr>
+          <a:lstStyle/>
+          <a:p>
+            <a:pPr marL="285750" indent="-285750">
+              <a:buFontTx/>
+              <a:buChar char="-"/>
+            </a:pPr>
+            <a:r>
+              <a:rPr lang="fr-FR" sz="5400" b="1" dirty="0">
+                <a:latin typeface="Josefin Slab" panose="02000000000000000000" pitchFamily="2" charset="0"/>
+              </a:rPr>
+              <a:t>Marketing</a:t>
+            </a:r>
+          </a:p>
+          <a:p>
+            <a:pPr marL="285750" indent="-285750">
+              <a:buFontTx/>
+              <a:buChar char="-"/>
+            </a:pPr>
+            <a:r>
+              <a:rPr lang="fr-FR" sz="5400" b="1" dirty="0">
+                <a:latin typeface="Josefin Slab" panose="02000000000000000000" pitchFamily="2" charset="0"/>
+              </a:rPr>
+              <a:t>Collecte de retours</a:t>
+            </a:r>
+          </a:p>
+          <a:p>
+            <a:pPr marL="285750" indent="-285750">
+              <a:buFontTx/>
+              <a:buChar char="-"/>
+            </a:pPr>
+            <a:r>
+              <a:rPr lang="fr-FR" sz="5400" b="1" dirty="0">
+                <a:latin typeface="Josefin Slab" panose="02000000000000000000" pitchFamily="2" charset="0"/>
+              </a:rPr>
+              <a:t>Nouvelles fonctionnalités</a:t>
+            </a:r>
+          </a:p>
+        </p:txBody>
+      </p:sp>
+      <p:sp>
+        <p:nvSpPr>
+          <p:cNvPr id="9" name="ZoneTexte 8">
+            <a:extLst>
+              <a:ext uri="{FF2B5EF4-FFF2-40B4-BE49-F238E27FC236}">
+                <a16:creationId xmlns:a16="http://schemas.microsoft.com/office/drawing/2014/main" id="{992F65AE-9EE6-B274-B40B-A032D67D840D}"/>
+              </a:ext>
+            </a:extLst>
+          </p:cNvPr>
+          <p:cNvSpPr txBox="1"/>
+          <p:nvPr/>
+        </p:nvSpPr>
+        <p:spPr>
+          <a:xfrm>
+            <a:off x="10773747" y="6434048"/>
+            <a:ext cx="1418253" cy="369332"/>
+          </a:xfrm>
+          <a:prstGeom prst="rect">
+            <a:avLst/>
+          </a:prstGeom>
+          <a:noFill/>
+        </p:spPr>
+        <p:txBody>
+          <a:bodyPr wrap="square" rtlCol="0">
+            <a:spAutoFit/>
+          </a:bodyPr>
+          <a:lstStyle/>
+          <a:p>
+            <a:r>
+              <a:rPr lang="fr-FR" dirty="0" err="1">
+                <a:solidFill>
+                  <a:srgbClr val="F2E8CF"/>
+                </a:solidFill>
+                <a:latin typeface="Josefin Slab" panose="02000000000000000000" pitchFamily="2" charset="0"/>
+              </a:rPr>
+              <a:t>Bachelor</a:t>
+            </a:r>
+            <a:r>
+              <a:rPr lang="fr-FR" dirty="0">
+                <a:solidFill>
+                  <a:srgbClr val="F2E8CF"/>
+                </a:solidFill>
+                <a:latin typeface="Josefin Slab" panose="02000000000000000000" pitchFamily="2" charset="0"/>
+              </a:rPr>
+              <a:t> RPI</a:t>
+            </a:r>
+          </a:p>
+        </p:txBody>
+      </p:sp>
+      <p:sp>
+        <p:nvSpPr>
+          <p:cNvPr id="11" name="ZoneTexte 10">
+            <a:extLst>
+              <a:ext uri="{FF2B5EF4-FFF2-40B4-BE49-F238E27FC236}">
+                <a16:creationId xmlns:a16="http://schemas.microsoft.com/office/drawing/2014/main" id="{1E9365C4-47A1-638B-9E5A-B85A53498870}"/>
+              </a:ext>
+            </a:extLst>
+          </p:cNvPr>
+          <p:cNvSpPr txBox="1"/>
+          <p:nvPr/>
+        </p:nvSpPr>
+        <p:spPr>
+          <a:xfrm>
+            <a:off x="0" y="54620"/>
+            <a:ext cx="12192000" cy="523220"/>
+          </a:xfrm>
+          <a:prstGeom prst="rect">
+            <a:avLst/>
+          </a:prstGeom>
+          <a:noFill/>
+        </p:spPr>
+        <p:txBody>
+          <a:bodyPr wrap="square" rtlCol="0">
+            <a:spAutoFit/>
+          </a:bodyPr>
+          <a:lstStyle/>
+          <a:p>
+            <a:pPr algn="ctr"/>
+            <a:r>
+              <a:rPr lang="fr-FR" sz="2800" b="1" dirty="0">
+                <a:solidFill>
+                  <a:srgbClr val="F2E8CF"/>
+                </a:solidFill>
+                <a:latin typeface="Josefin Slab" panose="02000000000000000000" pitchFamily="2" charset="0"/>
+              </a:rPr>
+              <a:t>Suite…</a:t>
+            </a:r>
+          </a:p>
+        </p:txBody>
+      </p:sp>
+    </p:spTree>
+    <p:extLst>
+      <p:ext uri="{BB962C8B-B14F-4D97-AF65-F5344CB8AC3E}">
+        <p14:creationId xmlns:p14="http://schemas.microsoft.com/office/powerpoint/2010/main" val="4035813613"/>
+      </p:ext>
+    </p:extLst>
+  </p:cSld>
+  <p:clrMapOvr>
+    <a:masterClrMapping/>
+  </p:clrMapOvr>
+  <mc:AlternateContent xmlns:mc="http://schemas.openxmlformats.org/markup-compatibility/2006">
+    <mc:Choice xmlns:p159="http://schemas.microsoft.com/office/powerpoint/2015/09/main" xmlns="" Requires="p159">
+      <p:transition xmlns:p14="http://schemas.microsoft.com/office/powerpoint/2010/main" spd="slow" p14:dur="2000">
+        <p159:morph option="byObject"/>
+      </p:transition>
+    </mc:Choice>
+    <mc:Fallback>
+      <p:transition spd="slow">
+        <p:fade/>
+      </p:transition>
+    </mc:Fallback>
+  </mc:AlternateContent>
+  <p:timing>
+    <p:tnLst>
+      <p:par>
+        <p:cTn id="1" dur="indefinite" restart="never" nodeType="tmRoot"/>
+      </p:par>
+    </p:tnLst>
+  </p:timing>
+</p:sld>
+</file>
+
+<file path=ppt/slides/slide9.xml><?xml version="1.0" encoding="utf-8"?>
+<p:sld xmlns:a="http://schemas.openxmlformats.org/drawingml/2006/main" xmlns:r="http://schemas.openxmlformats.org/officeDocument/2006/relationships" xmlns:p="http://schemas.openxmlformats.org/presentationml/2006/main">
+  <p:cSld>
+    <p:spTree>
+      <p:nvGrpSpPr>
+        <p:cNvPr id="1" name=""/>
+        <p:cNvGrpSpPr/>
+        <p:nvPr/>
+      </p:nvGrpSpPr>
+      <p:grpSpPr>
+        <a:xfrm>
+          <a:off x="0" y="0"/>
+          <a:ext cx="0" cy="0"/>
+          <a:chOff x="0" y="0"/>
+          <a:chExt cx="0" cy="0"/>
+        </a:xfrm>
+      </p:grpSpPr>
+      <p:sp>
+        <p:nvSpPr>
+          <p:cNvPr id="4" name="Rectangle 3">
+            <a:extLst>
+              <a:ext uri="{FF2B5EF4-FFF2-40B4-BE49-F238E27FC236}">
+                <a16:creationId xmlns:a16="http://schemas.microsoft.com/office/drawing/2014/main" id="{EBB56BDB-E14E-82A1-6EB0-7CC0F193CB3D}"/>
+              </a:ext>
+            </a:extLst>
+          </p:cNvPr>
+          <p:cNvSpPr/>
+          <p:nvPr/>
+        </p:nvSpPr>
+        <p:spPr>
+          <a:xfrm>
+            <a:off x="0" y="-30145"/>
+            <a:ext cx="12192000" cy="6858000"/>
+          </a:xfrm>
+          <a:prstGeom prst="rect">
+            <a:avLst/>
+          </a:prstGeom>
+          <a:solidFill>
+            <a:srgbClr val="F2E8CF"/>
+          </a:solidFill>
+          <a:ln>
+            <a:noFill/>
+          </a:ln>
+        </p:spPr>
+        <p:style>
+          <a:lnRef idx="2">
+            <a:schemeClr val="accent1">
+              <a:shade val="15000"/>
+            </a:schemeClr>
+          </a:lnRef>
+          <a:fillRef idx="1">
+            <a:schemeClr val="accent1"/>
+          </a:fillRef>
+          <a:effectRef idx="0">
+            <a:schemeClr val="accent1"/>
+          </a:effectRef>
+          <a:fontRef idx="minor">
+            <a:schemeClr val="lt1"/>
+          </a:fontRef>
+        </p:style>
+        <p:txBody>
+          <a:bodyPr rtlCol="0" anchor="ctr"/>
+          <a:lstStyle/>
+          <a:p>
+            <a:pPr algn="ctr"/>
+            <a:endParaRPr lang="fr-FR"/>
+          </a:p>
+        </p:txBody>
+      </p:sp>
+      <p:sp>
+        <p:nvSpPr>
+          <p:cNvPr id="5" name="Rectangle 4">
+            <a:extLst>
+              <a:ext uri="{FF2B5EF4-FFF2-40B4-BE49-F238E27FC236}">
+                <a16:creationId xmlns:a16="http://schemas.microsoft.com/office/drawing/2014/main" id="{6DE56A07-05B8-96F1-0F27-2D9D1661EEE3}"/>
+              </a:ext>
+            </a:extLst>
+          </p:cNvPr>
+          <p:cNvSpPr/>
+          <p:nvPr/>
+        </p:nvSpPr>
+        <p:spPr>
+          <a:xfrm>
+            <a:off x="0" y="0"/>
+            <a:ext cx="12192000" cy="632460"/>
+          </a:xfrm>
+          <a:prstGeom prst="rect">
+            <a:avLst/>
+          </a:prstGeom>
+          <a:solidFill>
+            <a:srgbClr val="6A994E"/>
+          </a:solidFill>
+          <a:ln>
+            <a:noFill/>
+          </a:ln>
+        </p:spPr>
+        <p:style>
+          <a:lnRef idx="2">
+            <a:schemeClr val="accent1">
+              <a:shade val="15000"/>
+            </a:schemeClr>
+          </a:lnRef>
+          <a:fillRef idx="1">
+            <a:schemeClr val="accent1"/>
+          </a:fillRef>
+          <a:effectRef idx="0">
+            <a:schemeClr val="accent1"/>
+          </a:effectRef>
+          <a:fontRef idx="minor">
+            <a:schemeClr val="lt1"/>
+          </a:fontRef>
+        </p:style>
+        <p:txBody>
+          <a:bodyPr rtlCol="0" anchor="ctr"/>
+          <a:lstStyle/>
+          <a:p>
+            <a:pPr algn="ctr"/>
+            <a:endParaRPr lang="fr-FR"/>
+          </a:p>
+        </p:txBody>
+      </p:sp>
+      <p:sp>
+        <p:nvSpPr>
+          <p:cNvPr id="6" name="Rectangle 5">
+            <a:extLst>
+              <a:ext uri="{FF2B5EF4-FFF2-40B4-BE49-F238E27FC236}">
+                <a16:creationId xmlns:a16="http://schemas.microsoft.com/office/drawing/2014/main" id="{97595E1C-2581-EB1B-6819-6060C625E8C0}"/>
+              </a:ext>
+            </a:extLst>
+          </p:cNvPr>
+          <p:cNvSpPr/>
+          <p:nvPr/>
+        </p:nvSpPr>
+        <p:spPr>
+          <a:xfrm>
+            <a:off x="0" y="6339840"/>
+            <a:ext cx="12192000" cy="518160"/>
+          </a:xfrm>
+          <a:prstGeom prst="rect">
+            <a:avLst/>
+          </a:prstGeom>
+          <a:solidFill>
+            <a:srgbClr val="6A994E"/>
+          </a:solidFill>
+          <a:ln>
+            <a:noFill/>
+          </a:ln>
+        </p:spPr>
+        <p:style>
+          <a:lnRef idx="2">
+            <a:schemeClr val="accent1">
+              <a:shade val="15000"/>
+            </a:schemeClr>
+          </a:lnRef>
+          <a:fillRef idx="1">
+            <a:schemeClr val="accent1"/>
+          </a:fillRef>
+          <a:effectRef idx="0">
+            <a:schemeClr val="accent1"/>
+          </a:effectRef>
+          <a:fontRef idx="minor">
+            <a:schemeClr val="lt1"/>
+          </a:fontRef>
+        </p:style>
+        <p:txBody>
+          <a:bodyPr rtlCol="0" anchor="ctr"/>
+          <a:lstStyle/>
+          <a:p>
+            <a:pPr algn="ctr"/>
+            <a:endParaRPr lang="fr-FR"/>
+          </a:p>
+        </p:txBody>
+      </p:sp>
+      <p:sp>
+        <p:nvSpPr>
+          <p:cNvPr id="2" name="ZoneTexte 1">
+            <a:extLst>
+              <a:ext uri="{FF2B5EF4-FFF2-40B4-BE49-F238E27FC236}">
+                <a16:creationId xmlns:a16="http://schemas.microsoft.com/office/drawing/2014/main" id="{59BB4A6D-3EBB-AC35-40B1-37C5140E7B97}"/>
+              </a:ext>
+            </a:extLst>
+          </p:cNvPr>
+          <p:cNvSpPr txBox="1"/>
+          <p:nvPr/>
+        </p:nvSpPr>
+        <p:spPr>
+          <a:xfrm>
+            <a:off x="83820" y="6414254"/>
+            <a:ext cx="1828800" cy="369332"/>
+          </a:xfrm>
+          <a:prstGeom prst="rect">
+            <a:avLst/>
+          </a:prstGeom>
+          <a:noFill/>
+        </p:spPr>
+        <p:txBody>
+          <a:bodyPr wrap="square" rtlCol="0">
+            <a:spAutoFit/>
+          </a:bodyPr>
+          <a:lstStyle/>
+          <a:p>
+            <a:r>
+              <a:rPr lang="fr-FR" dirty="0">
+                <a:solidFill>
+                  <a:srgbClr val="F2E8CF"/>
+                </a:solidFill>
+                <a:latin typeface="Josefin Slab" panose="02000000000000000000" pitchFamily="2" charset="0"/>
+              </a:rPr>
+              <a:t>Esteban Basson</a:t>
+            </a:r>
+          </a:p>
+        </p:txBody>
+      </p:sp>
+      <p:sp>
+        <p:nvSpPr>
+          <p:cNvPr id="9" name="ZoneTexte 8">
+            <a:extLst>
+              <a:ext uri="{FF2B5EF4-FFF2-40B4-BE49-F238E27FC236}">
+                <a16:creationId xmlns:a16="http://schemas.microsoft.com/office/drawing/2014/main" id="{992F65AE-9EE6-B274-B40B-A032D67D840D}"/>
+              </a:ext>
+            </a:extLst>
+          </p:cNvPr>
+          <p:cNvSpPr txBox="1"/>
+          <p:nvPr/>
+        </p:nvSpPr>
+        <p:spPr>
+          <a:xfrm>
+            <a:off x="10773747" y="6434048"/>
+            <a:ext cx="1418253" cy="369332"/>
+          </a:xfrm>
+          <a:prstGeom prst="rect">
+            <a:avLst/>
+          </a:prstGeom>
+          <a:noFill/>
+        </p:spPr>
+        <p:txBody>
+          <a:bodyPr wrap="square" rtlCol="0">
+            <a:spAutoFit/>
+          </a:bodyPr>
+          <a:lstStyle/>
+          <a:p>
+            <a:r>
+              <a:rPr lang="fr-FR" dirty="0" err="1">
+                <a:solidFill>
+                  <a:srgbClr val="F2E8CF"/>
+                </a:solidFill>
+                <a:latin typeface="Josefin Slab" panose="02000000000000000000" pitchFamily="2" charset="0"/>
+              </a:rPr>
+              <a:t>Bachelor</a:t>
+            </a:r>
+            <a:r>
+              <a:rPr lang="fr-FR" dirty="0">
+                <a:solidFill>
+                  <a:srgbClr val="F2E8CF"/>
+                </a:solidFill>
+                <a:latin typeface="Josefin Slab" panose="02000000000000000000" pitchFamily="2" charset="0"/>
+              </a:rPr>
+              <a:t> RPI</a:t>
+            </a:r>
+          </a:p>
+        </p:txBody>
+      </p:sp>
+      <p:sp>
+        <p:nvSpPr>
+          <p:cNvPr id="11" name="ZoneTexte 10">
+            <a:extLst>
+              <a:ext uri="{FF2B5EF4-FFF2-40B4-BE49-F238E27FC236}">
+                <a16:creationId xmlns:a16="http://schemas.microsoft.com/office/drawing/2014/main" id="{1E9365C4-47A1-638B-9E5A-B85A53498870}"/>
+              </a:ext>
+            </a:extLst>
+          </p:cNvPr>
+          <p:cNvSpPr txBox="1"/>
+          <p:nvPr/>
+        </p:nvSpPr>
+        <p:spPr>
+          <a:xfrm>
+            <a:off x="0" y="54620"/>
+            <a:ext cx="12192000" cy="523220"/>
+          </a:xfrm>
+          <a:prstGeom prst="rect">
+            <a:avLst/>
+          </a:prstGeom>
+          <a:noFill/>
+        </p:spPr>
+        <p:txBody>
+          <a:bodyPr wrap="square" rtlCol="0">
+            <a:spAutoFit/>
+          </a:bodyPr>
+          <a:lstStyle/>
+          <a:p>
+            <a:pPr algn="ctr"/>
+            <a:r>
+              <a:rPr lang="fr-FR" sz="2800" b="1" dirty="0" smtClean="0">
+                <a:solidFill>
+                  <a:srgbClr val="F2E8CF"/>
+                </a:solidFill>
+                <a:latin typeface="Josefin Slab" panose="02000000000000000000" pitchFamily="2" charset="0"/>
+              </a:rPr>
+              <a:t>Merci</a:t>
+            </a:r>
+            <a:endParaRPr lang="fr-FR" sz="2800" b="1" dirty="0">
+              <a:solidFill>
+                <a:srgbClr val="F2E8CF"/>
+              </a:solidFill>
+              <a:latin typeface="Josefin Slab" panose="02000000000000000000" pitchFamily="2" charset="0"/>
+            </a:endParaRPr>
+          </a:p>
+        </p:txBody>
+      </p:sp>
+      <p:sp>
+        <p:nvSpPr>
+          <p:cNvPr id="8" name="ZoneTexte 7">
+            <a:extLst>
+              <a:ext uri="{FF2B5EF4-FFF2-40B4-BE49-F238E27FC236}">
+                <a16:creationId xmlns:a16="http://schemas.microsoft.com/office/drawing/2014/main" id="{6699D9B0-71B5-D04A-A7EC-9AE14264E231}"/>
+              </a:ext>
+            </a:extLst>
+          </p:cNvPr>
+          <p:cNvSpPr txBox="1"/>
+          <p:nvPr/>
+        </p:nvSpPr>
+        <p:spPr>
+          <a:xfrm>
+            <a:off x="2033116" y="3024485"/>
+            <a:ext cx="8125768" cy="923330"/>
+          </a:xfrm>
+          <a:prstGeom prst="rect">
+            <a:avLst/>
+          </a:prstGeom>
+          <a:noFill/>
+        </p:spPr>
+        <p:txBody>
+          <a:bodyPr wrap="square" rtlCol="0">
+            <a:spAutoFit/>
+          </a:bodyPr>
+          <a:lstStyle/>
+          <a:p>
+            <a:r>
+              <a:rPr lang="fr-FR" sz="5400" b="1" dirty="0" smtClean="0">
+                <a:latin typeface="Josefin Slab" panose="02000000000000000000" pitchFamily="2" charset="0"/>
+              </a:rPr>
+              <a:t>Merci pour votre attention</a:t>
+            </a:r>
+            <a:endParaRPr lang="fr-FR" sz="5400" b="1" dirty="0">
+              <a:latin typeface="Josefin Slab" panose="02000000000000000000" pitchFamily="2" charset="0"/>
+            </a:endParaRPr>
+          </a:p>
+        </p:txBody>
+      </p:sp>
+    </p:spTree>
+    <p:extLst>
+      <p:ext uri="{BB962C8B-B14F-4D97-AF65-F5344CB8AC3E}">
+        <p14:creationId xmlns:p14="http://schemas.microsoft.com/office/powerpoint/2010/main" val="2054418871"/>
+      </p:ext>
+    </p:extLst>
+  </p:cSld>
+  <p:clrMapOvr>
+    <a:masterClrMapping/>
+  </p:clrMapOvr>
+  <mc:AlternateContent xmlns:mc="http://schemas.openxmlformats.org/markup-compatibility/2006">
+    <mc:Choice xmlns:p159="http://schemas.microsoft.com/office/powerpoint/2015/09/main" xmlns="" Requires="p159">
+      <p:transition xmlns:p14="http://schemas.microsoft.com/office/powerpoint/2010/main" spd="slow" p14:dur="2000">
+        <p159:morph option="byObject"/>
+      </p:transition>
+    </mc:Choice>
+    <mc:Fallback>
+      <p:transition spd="slow">
+        <p:fade/>
+      </p:transition>
+    </mc:Fallback>
+  </mc:AlternateContent>
+  <p:timing>
+    <p:tnLst>
+      <p:par>
+        <p:cTn id="1" dur="indefinite" restart="never" nodeType="tmRoot"/>
+      </p:par>
+    </p:tnLst>
+  </p:timing>
 </p:sld>
 </file>
 

</xml_diff>